<commit_message>
modified my ppt file
</commit_message>
<xml_diff>
--- a/Customer_Churn_Prediction_Presentation.pptx
+++ b/Customer_Churn_Prediction_Presentation.pptx
@@ -13,10 +13,12 @@
     <p:sldId id="261" r:id="rId7"/>
     <p:sldId id="262" r:id="rId8"/>
     <p:sldId id="267" r:id="rId9"/>
-    <p:sldId id="263" r:id="rId10"/>
-    <p:sldId id="264" r:id="rId11"/>
-    <p:sldId id="265" r:id="rId12"/>
-    <p:sldId id="266" r:id="rId13"/>
+    <p:sldId id="268" r:id="rId10"/>
+    <p:sldId id="269" r:id="rId11"/>
+    <p:sldId id="263" r:id="rId12"/>
+    <p:sldId id="264" r:id="rId13"/>
+    <p:sldId id="265" r:id="rId14"/>
+    <p:sldId id="266" r:id="rId15"/>
   </p:sldIdLst>
   <p:sldSz cx="9144000" cy="6858000" type="screen4x3"/>
   <p:notesSz cx="6858000" cy="9144000"/>
@@ -132,6 +134,82 @@
     </p:ext>
   </p:extLst>
 </p:presentation>
+</file>
+
+<file path=ppt/changesInfos/changesInfo1.xml><?xml version="1.0" encoding="utf-8"?>
+<pc:chgInfo xmlns:a="http://schemas.openxmlformats.org/drawingml/2006/main" xmlns:r="http://schemas.openxmlformats.org/officeDocument/2006/relationships" xmlns:ac="http://schemas.microsoft.com/office/drawing/2013/main/command" xmlns:pc="http://schemas.microsoft.com/office/powerpoint/2013/main/command">
+  <pc:docChgLst>
+    <pc:chgData name="Wadhare Isaac" userId="e94a52105852c8e3" providerId="LiveId" clId="{CAF51A06-E4BB-4B40-BCCA-B1F6B78C486C}"/>
+    <pc:docChg chg="custSel addSld modSld">
+      <pc:chgData name="Wadhare Isaac" userId="e94a52105852c8e3" providerId="LiveId" clId="{CAF51A06-E4BB-4B40-BCCA-B1F6B78C486C}" dt="2025-07-23T19:00:28.469" v="27" actId="14100"/>
+      <pc:docMkLst>
+        <pc:docMk/>
+      </pc:docMkLst>
+      <pc:sldChg chg="addSp delSp modSp new mod">
+        <pc:chgData name="Wadhare Isaac" userId="e94a52105852c8e3" providerId="LiveId" clId="{CAF51A06-E4BB-4B40-BCCA-B1F6B78C486C}" dt="2025-07-23T18:59:08.601" v="17" actId="113"/>
+        <pc:sldMkLst>
+          <pc:docMk/>
+          <pc:sldMk cId="98171490" sldId="268"/>
+        </pc:sldMkLst>
+        <pc:spChg chg="mod">
+          <ac:chgData name="Wadhare Isaac" userId="e94a52105852c8e3" providerId="LiveId" clId="{CAF51A06-E4BB-4B40-BCCA-B1F6B78C486C}" dt="2025-07-23T18:57:38.837" v="2"/>
+          <ac:spMkLst>
+            <pc:docMk/>
+            <pc:sldMk cId="98171490" sldId="268"/>
+            <ac:spMk id="2" creationId="{6050A295-C5A0-9356-F84C-D6A7BECA0C77}"/>
+          </ac:spMkLst>
+        </pc:spChg>
+        <pc:spChg chg="del">
+          <ac:chgData name="Wadhare Isaac" userId="e94a52105852c8e3" providerId="LiveId" clId="{CAF51A06-E4BB-4B40-BCCA-B1F6B78C486C}" dt="2025-07-23T18:57:22.305" v="1"/>
+          <ac:spMkLst>
+            <pc:docMk/>
+            <pc:sldMk cId="98171490" sldId="268"/>
+            <ac:spMk id="3" creationId="{499C2D83-5584-92EE-B461-285D302A487E}"/>
+          </ac:spMkLst>
+        </pc:spChg>
+        <pc:spChg chg="add mod">
+          <ac:chgData name="Wadhare Isaac" userId="e94a52105852c8e3" providerId="LiveId" clId="{CAF51A06-E4BB-4B40-BCCA-B1F6B78C486C}" dt="2025-07-23T18:59:08.601" v="17" actId="113"/>
+          <ac:spMkLst>
+            <pc:docMk/>
+            <pc:sldMk cId="98171490" sldId="268"/>
+            <ac:spMk id="4" creationId="{19AEB282-CFE4-2F59-5E55-87CBDFCD514F}"/>
+          </ac:spMkLst>
+        </pc:spChg>
+      </pc:sldChg>
+      <pc:sldChg chg="addSp delSp modSp new mod">
+        <pc:chgData name="Wadhare Isaac" userId="e94a52105852c8e3" providerId="LiveId" clId="{CAF51A06-E4BB-4B40-BCCA-B1F6B78C486C}" dt="2025-07-23T19:00:28.469" v="27" actId="14100"/>
+        <pc:sldMkLst>
+          <pc:docMk/>
+          <pc:sldMk cId="1621274177" sldId="269"/>
+        </pc:sldMkLst>
+        <pc:spChg chg="del">
+          <ac:chgData name="Wadhare Isaac" userId="e94a52105852c8e3" providerId="LiveId" clId="{CAF51A06-E4BB-4B40-BCCA-B1F6B78C486C}" dt="2025-07-23T19:00:17.982" v="24" actId="21"/>
+          <ac:spMkLst>
+            <pc:docMk/>
+            <pc:sldMk cId="1621274177" sldId="269"/>
+            <ac:spMk id="2" creationId="{CD02FF52-78D8-9E41-3F2E-B1E2A54C0B94}"/>
+          </ac:spMkLst>
+        </pc:spChg>
+        <pc:spChg chg="del">
+          <ac:chgData name="Wadhare Isaac" userId="e94a52105852c8e3" providerId="LiveId" clId="{CAF51A06-E4BB-4B40-BCCA-B1F6B78C486C}" dt="2025-07-23T18:59:50.540" v="19" actId="22"/>
+          <ac:spMkLst>
+            <pc:docMk/>
+            <pc:sldMk cId="1621274177" sldId="269"/>
+            <ac:spMk id="3" creationId="{B1823D5E-CEFC-F37E-C86F-656EC60D2E1A}"/>
+          </ac:spMkLst>
+        </pc:spChg>
+        <pc:picChg chg="add mod ord">
+          <ac:chgData name="Wadhare Isaac" userId="e94a52105852c8e3" providerId="LiveId" clId="{CAF51A06-E4BB-4B40-BCCA-B1F6B78C486C}" dt="2025-07-23T19:00:28.469" v="27" actId="14100"/>
+          <ac:picMkLst>
+            <pc:docMk/>
+            <pc:sldMk cId="1621274177" sldId="269"/>
+            <ac:picMk id="5" creationId="{1F099CEE-9055-C7AF-0F02-84C2BEC03677}"/>
+          </ac:picMkLst>
+        </pc:picChg>
+      </pc:sldChg>
+    </pc:docChg>
+  </pc:docChgLst>
+</pc:chgInfo>
 </file>
 
 <file path=ppt/slideLayouts/slideLayout1.xml><?xml version="1.0" encoding="utf-8"?>
@@ -7760,62 +7838,41 @@
           <a:chExt cx="0" cy="0"/>
         </a:xfrm>
       </p:grpSpPr>
-      <p:sp>
-        <p:nvSpPr>
-          <p:cNvPr id="2" name="Title 1"/>
-          <p:cNvSpPr>
-            <a:spLocks noGrp="1"/>
-          </p:cNvSpPr>
-          <p:nvPr>
-            <p:ph type="title"/>
-          </p:nvPr>
-        </p:nvSpPr>
-        <p:spPr/>
-        <p:txBody>
-          <a:bodyPr/>
-          <a:lstStyle/>
-          <a:p>
-            <a:r>
-              <a:t>Limitations</a:t>
-            </a:r>
-          </a:p>
-        </p:txBody>
-      </p:sp>
-      <p:sp>
-        <p:nvSpPr>
-          <p:cNvPr id="3" name="Content Placeholder 2"/>
-          <p:cNvSpPr>
-            <a:spLocks noGrp="1"/>
-          </p:cNvSpPr>
+      <p:pic>
+        <p:nvPicPr>
+          <p:cNvPr id="5" name="Content Placeholder 4">
+            <a:extLst>
+              <a:ext uri="{FF2B5EF4-FFF2-40B4-BE49-F238E27FC236}">
+                <a16:creationId xmlns:a16="http://schemas.microsoft.com/office/drawing/2014/main" id="{1F099CEE-9055-C7AF-0F02-84C2BEC03677}"/>
+              </a:ext>
+            </a:extLst>
+          </p:cNvPr>
+          <p:cNvPicPr>
+            <a:picLocks noGrp="1" noChangeAspect="1"/>
+          </p:cNvPicPr>
           <p:nvPr>
             <p:ph idx="1"/>
           </p:nvPr>
-        </p:nvSpPr>
-        <p:spPr/>
-        <p:txBody>
-          <a:bodyPr/>
-          <a:lstStyle/>
-          <a:p>
-            <a:r>
-              <a:rPr sz="1800"/>
-              <a:t>- Only tabular data used; call/text content not analyzed.</a:t>
-            </a:r>
-          </a:p>
-          <a:p>
-            <a:r>
-              <a:rPr sz="1800"/>
-              <a:t>- Assumes data is accurate and complete.</a:t>
-            </a:r>
-          </a:p>
-          <a:p>
-            <a:r>
-              <a:rPr sz="1800"/>
-              <a:t>- Churn may be influenced by external factors not in dataset.</a:t>
-            </a:r>
-          </a:p>
-        </p:txBody>
-      </p:sp>
+        </p:nvPicPr>
+        <p:blipFill>
+          <a:blip r:embed="rId2"/>
+          <a:stretch>
+            <a:fillRect/>
+          </a:stretch>
+        </p:blipFill>
+        <p:spPr>
+          <a:xfrm>
+            <a:off x="1756881" y="575353"/>
+            <a:ext cx="6777519" cy="5568593"/>
+          </a:xfrm>
+        </p:spPr>
+      </p:pic>
     </p:spTree>
+    <p:extLst>
+      <p:ext uri="{BB962C8B-B14F-4D97-AF65-F5344CB8AC3E}">
+        <p14:creationId xmlns:p14="http://schemas.microsoft.com/office/powerpoint/2010/main" val="1621274177"/>
+      </p:ext>
+    </p:extLst>
   </p:cSld>
   <p:clrMapOvr>
     <a:masterClrMapping/>
@@ -7856,7 +7913,7 @@
           <a:lstStyle/>
           <a:p>
             <a:r>
-              <a:t>Next Steps</a:t>
+              <a:t>Business Recommendations</a:t>
             </a:r>
           </a:p>
         </p:txBody>
@@ -7878,19 +7935,25 @@
           <a:p>
             <a:r>
               <a:rPr sz="1800"/>
-              <a:t>- Implement churn alerts system.</a:t>
+              <a:t>- Offer better value for high-usage customers.</a:t>
             </a:r>
           </a:p>
           <a:p>
             <a:r>
               <a:rPr sz="1800"/>
-              <a:t>- Test personalized retention offers.</a:t>
+              <a:t>- Monitor frequent service callers for dissatisfaction.</a:t>
             </a:r>
           </a:p>
           <a:p>
             <a:r>
               <a:rPr sz="1800"/>
-              <a:t>- Collect feedback from churned customers.</a:t>
+              <a:t>- Review pricing for international plans.</a:t>
+            </a:r>
+          </a:p>
+          <a:p>
+            <a:r>
+              <a:rPr sz="1800"/>
+              <a:t>- Provide onboarding support to new users.</a:t>
             </a:r>
           </a:p>
         </p:txBody>
@@ -7904,6 +7967,166 @@
 </file>
 
 <file path=ppt/slides/slide12.xml><?xml version="1.0" encoding="utf-8"?>
+<p:sld xmlns:a="http://schemas.openxmlformats.org/drawingml/2006/main" xmlns:r="http://schemas.openxmlformats.org/officeDocument/2006/relationships" xmlns:p="http://schemas.openxmlformats.org/presentationml/2006/main">
+  <p:cSld>
+    <p:spTree>
+      <p:nvGrpSpPr>
+        <p:cNvPr id="1" name=""/>
+        <p:cNvGrpSpPr/>
+        <p:nvPr/>
+      </p:nvGrpSpPr>
+      <p:grpSpPr>
+        <a:xfrm>
+          <a:off x="0" y="0"/>
+          <a:ext cx="0" cy="0"/>
+          <a:chOff x="0" y="0"/>
+          <a:chExt cx="0" cy="0"/>
+        </a:xfrm>
+      </p:grpSpPr>
+      <p:sp>
+        <p:nvSpPr>
+          <p:cNvPr id="2" name="Title 1"/>
+          <p:cNvSpPr>
+            <a:spLocks noGrp="1"/>
+          </p:cNvSpPr>
+          <p:nvPr>
+            <p:ph type="title"/>
+          </p:nvPr>
+        </p:nvSpPr>
+        <p:spPr/>
+        <p:txBody>
+          <a:bodyPr/>
+          <a:lstStyle/>
+          <a:p>
+            <a:r>
+              <a:t>Limitations</a:t>
+            </a:r>
+          </a:p>
+        </p:txBody>
+      </p:sp>
+      <p:sp>
+        <p:nvSpPr>
+          <p:cNvPr id="3" name="Content Placeholder 2"/>
+          <p:cNvSpPr>
+            <a:spLocks noGrp="1"/>
+          </p:cNvSpPr>
+          <p:nvPr>
+            <p:ph idx="1"/>
+          </p:nvPr>
+        </p:nvSpPr>
+        <p:spPr/>
+        <p:txBody>
+          <a:bodyPr/>
+          <a:lstStyle/>
+          <a:p>
+            <a:r>
+              <a:rPr sz="1800"/>
+              <a:t>- Only tabular data used; call/text content not analyzed.</a:t>
+            </a:r>
+          </a:p>
+          <a:p>
+            <a:r>
+              <a:rPr sz="1800"/>
+              <a:t>- Assumes data is accurate and complete.</a:t>
+            </a:r>
+          </a:p>
+          <a:p>
+            <a:r>
+              <a:rPr sz="1800"/>
+              <a:t>- Churn may be influenced by external factors not in dataset.</a:t>
+            </a:r>
+          </a:p>
+        </p:txBody>
+      </p:sp>
+    </p:spTree>
+  </p:cSld>
+  <p:clrMapOvr>
+    <a:masterClrMapping/>
+  </p:clrMapOvr>
+</p:sld>
+</file>
+
+<file path=ppt/slides/slide13.xml><?xml version="1.0" encoding="utf-8"?>
+<p:sld xmlns:a="http://schemas.openxmlformats.org/drawingml/2006/main" xmlns:r="http://schemas.openxmlformats.org/officeDocument/2006/relationships" xmlns:p="http://schemas.openxmlformats.org/presentationml/2006/main">
+  <p:cSld>
+    <p:spTree>
+      <p:nvGrpSpPr>
+        <p:cNvPr id="1" name=""/>
+        <p:cNvGrpSpPr/>
+        <p:nvPr/>
+      </p:nvGrpSpPr>
+      <p:grpSpPr>
+        <a:xfrm>
+          <a:off x="0" y="0"/>
+          <a:ext cx="0" cy="0"/>
+          <a:chOff x="0" y="0"/>
+          <a:chExt cx="0" cy="0"/>
+        </a:xfrm>
+      </p:grpSpPr>
+      <p:sp>
+        <p:nvSpPr>
+          <p:cNvPr id="2" name="Title 1"/>
+          <p:cNvSpPr>
+            <a:spLocks noGrp="1"/>
+          </p:cNvSpPr>
+          <p:nvPr>
+            <p:ph type="title"/>
+          </p:nvPr>
+        </p:nvSpPr>
+        <p:spPr/>
+        <p:txBody>
+          <a:bodyPr/>
+          <a:lstStyle/>
+          <a:p>
+            <a:r>
+              <a:t>Next Steps</a:t>
+            </a:r>
+          </a:p>
+        </p:txBody>
+      </p:sp>
+      <p:sp>
+        <p:nvSpPr>
+          <p:cNvPr id="3" name="Content Placeholder 2"/>
+          <p:cNvSpPr>
+            <a:spLocks noGrp="1"/>
+          </p:cNvSpPr>
+          <p:nvPr>
+            <p:ph idx="1"/>
+          </p:nvPr>
+        </p:nvSpPr>
+        <p:spPr/>
+        <p:txBody>
+          <a:bodyPr/>
+          <a:lstStyle/>
+          <a:p>
+            <a:r>
+              <a:rPr sz="1800"/>
+              <a:t>- Implement churn alerts system.</a:t>
+            </a:r>
+          </a:p>
+          <a:p>
+            <a:r>
+              <a:rPr sz="1800"/>
+              <a:t>- Test personalized retention offers.</a:t>
+            </a:r>
+          </a:p>
+          <a:p>
+            <a:r>
+              <a:rPr sz="1800"/>
+              <a:t>- Collect feedback from churned customers.</a:t>
+            </a:r>
+          </a:p>
+        </p:txBody>
+      </p:sp>
+    </p:spTree>
+  </p:cSld>
+  <p:clrMapOvr>
+    <a:masterClrMapping/>
+  </p:clrMapOvr>
+</p:sld>
+</file>
+
+<file path=ppt/slides/slide14.xml><?xml version="1.0" encoding="utf-8"?>
 <p:sld xmlns:a="http://schemas.openxmlformats.org/drawingml/2006/main" xmlns:r="http://schemas.openxmlformats.org/officeDocument/2006/relationships" xmlns:p="http://schemas.openxmlformats.org/presentationml/2006/main">
   <p:cSld>
     <p:spTree>
@@ -8733,7 +8956,13 @@
       </p:grpSpPr>
       <p:sp>
         <p:nvSpPr>
-          <p:cNvPr id="2" name="Title 1"/>
+          <p:cNvPr id="2" name="Title 1">
+            <a:extLst>
+              <a:ext uri="{FF2B5EF4-FFF2-40B4-BE49-F238E27FC236}">
+                <a16:creationId xmlns:a16="http://schemas.microsoft.com/office/drawing/2014/main" id="{6050A295-C5A0-9356-F84C-D6A7BECA0C77}"/>
+              </a:ext>
+            </a:extLst>
+          </p:cNvPr>
           <p:cNvSpPr>
             <a:spLocks noGrp="1"/>
           </p:cNvSpPr>
@@ -8747,52 +8976,434 @@
           <a:lstStyle/>
           <a:p>
             <a:r>
-              <a:t>Business Recommendations</a:t>
-            </a:r>
-          </a:p>
-        </p:txBody>
-      </p:sp>
-      <p:sp>
-        <p:nvSpPr>
-          <p:cNvPr id="3" name="Content Placeholder 2"/>
-          <p:cNvSpPr>
-            <a:spLocks noGrp="1"/>
+              <a:rPr lang="en-US" dirty="0"/>
+              <a:t>Model Comparison: ROC Curve &amp; AUC</a:t>
+            </a:r>
+          </a:p>
+        </p:txBody>
+      </p:sp>
+      <p:sp>
+        <p:nvSpPr>
+          <p:cNvPr id="4" name="Rectangle 1">
+            <a:extLst>
+              <a:ext uri="{FF2B5EF4-FFF2-40B4-BE49-F238E27FC236}">
+                <a16:creationId xmlns:a16="http://schemas.microsoft.com/office/drawing/2014/main" id="{19AEB282-CFE4-2F59-5E55-87CBDFCD514F}"/>
+              </a:ext>
+            </a:extLst>
+          </p:cNvPr>
+          <p:cNvSpPr>
+            <a:spLocks noGrp="1" noChangeArrowheads="1"/>
           </p:cNvSpPr>
           <p:nvPr>
             <p:ph idx="1"/>
           </p:nvPr>
         </p:nvSpPr>
-        <p:spPr/>
-        <p:txBody>
-          <a:bodyPr/>
+        <p:spPr bwMode="auto">
+          <a:xfrm>
+            <a:off x="1274595" y="2452751"/>
+            <a:ext cx="7404591" cy="3139321"/>
+          </a:xfrm>
+          <a:prstGeom prst="rect">
+            <a:avLst/>
+          </a:prstGeom>
+          <a:noFill/>
+          <a:ln>
+            <a:noFill/>
+          </a:ln>
+          <a:effectLst/>
+          <a:extLst>
+            <a:ext uri="{909E8E84-426E-40DD-AFC4-6F175D3DCCD1}">
+              <a14:hiddenFill xmlns:a14="http://schemas.microsoft.com/office/drawing/2010/main">
+                <a:solidFill>
+                  <a:schemeClr val="accent1"/>
+                </a:solidFill>
+              </a14:hiddenFill>
+            </a:ext>
+            <a:ext uri="{91240B29-F687-4F45-9708-019B960494DF}">
+              <a14:hiddenLine xmlns:a14="http://schemas.microsoft.com/office/drawing/2010/main" w="9525">
+                <a:solidFill>
+                  <a:schemeClr val="tx1"/>
+                </a:solidFill>
+                <a:miter lim="800000"/>
+                <a:headEnd/>
+                <a:tailEnd/>
+              </a14:hiddenLine>
+            </a:ext>
+            <a:ext uri="{AF507438-7753-43E0-B8FC-AC1667EBCBE1}">
+              <a14:hiddenEffects xmlns:a14="http://schemas.microsoft.com/office/drawing/2010/main">
+                <a:effectLst>
+                  <a:outerShdw dist="35921" dir="2700000" algn="ctr" rotWithShape="0">
+                    <a:schemeClr val="bg2"/>
+                  </a:outerShdw>
+                </a:effectLst>
+              </a14:hiddenEffects>
+            </a:ext>
+          </a:extLst>
+        </p:spPr>
+        <p:txBody>
+          <a:bodyPr vert="horz" wrap="none" lIns="91440" tIns="45720" rIns="91440" bIns="45720" numCol="1" anchor="ctr" anchorCtr="0" compatLnSpc="1">
+            <a:prstTxWarp prst="textNoShape">
+              <a:avLst/>
+            </a:prstTxWarp>
+            <a:spAutoFit/>
+          </a:bodyPr>
           <a:lstStyle/>
           <a:p>
-            <a:r>
-              <a:rPr sz="1800"/>
-              <a:t>- Offer better value for high-usage customers.</a:t>
-            </a:r>
-          </a:p>
-          <a:p>
-            <a:r>
-              <a:rPr sz="1800"/>
-              <a:t>- Monitor frequent service callers for dissatisfaction.</a:t>
-            </a:r>
-          </a:p>
-          <a:p>
-            <a:r>
-              <a:rPr sz="1800"/>
-              <a:t>- Review pricing for international plans.</a:t>
-            </a:r>
-          </a:p>
-          <a:p>
-            <a:r>
-              <a:rPr sz="1800"/>
-              <a:t>- Provide onboarding support to new users.</a:t>
+            <a:pPr marL="0" marR="0" lvl="0" indent="0" algn="l" defTabSz="914400" rtl="0" eaLnBrk="0" fontAlgn="base" latinLnBrk="0" hangingPunct="0">
+              <a:lnSpc>
+                <a:spcPct val="100000"/>
+              </a:lnSpc>
+              <a:spcBef>
+                <a:spcPct val="0"/>
+              </a:spcBef>
+              <a:spcAft>
+                <a:spcPct val="0"/>
+              </a:spcAft>
+              <a:buClrTx/>
+              <a:buSzTx/>
+              <a:buFontTx/>
+              <a:buChar char="•"/>
+              <a:tabLst/>
+            </a:pPr>
+            <a:r>
+              <a:rPr kumimoji="0" lang="en-US" altLang="en-US" sz="1800" b="1" i="0" u="none" strike="noStrike" cap="none" normalizeH="0" baseline="0" dirty="0">
+                <a:ln>
+                  <a:noFill/>
+                </a:ln>
+                <a:solidFill>
+                  <a:schemeClr val="tx1"/>
+                </a:solidFill>
+                <a:effectLst/>
+                <a:latin typeface="Arial" panose="020B0604020202020204" pitchFamily="34" charset="0"/>
+              </a:rPr>
+              <a:t>Why ROC?</a:t>
+            </a:r>
+            <a:br>
+              <a:rPr kumimoji="0" lang="en-US" altLang="en-US" sz="1800" b="0" i="0" u="none" strike="noStrike" cap="none" normalizeH="0" baseline="0" dirty="0">
+                <a:ln>
+                  <a:noFill/>
+                </a:ln>
+                <a:solidFill>
+                  <a:schemeClr val="tx1"/>
+                </a:solidFill>
+                <a:effectLst/>
+                <a:latin typeface="Arial" panose="020B0604020202020204" pitchFamily="34" charset="0"/>
+              </a:rPr>
+            </a:br>
+            <a:r>
+              <a:rPr kumimoji="0" lang="en-US" altLang="en-US" sz="1800" i="0" u="none" strike="noStrike" cap="none" normalizeH="0" baseline="0" dirty="0">
+                <a:ln>
+                  <a:noFill/>
+                </a:ln>
+                <a:solidFill>
+                  <a:schemeClr val="tx1"/>
+                </a:solidFill>
+                <a:effectLst/>
+                <a:latin typeface="Arial" panose="020B0604020202020204" pitchFamily="34" charset="0"/>
+              </a:rPr>
+              <a:t>Measures how well models distinguish churn vs. non-churn customers.</a:t>
+            </a:r>
+          </a:p>
+          <a:p>
+            <a:pPr marL="0" marR="0" lvl="0" indent="0" algn="l" defTabSz="914400" rtl="0" eaLnBrk="0" fontAlgn="base" latinLnBrk="0" hangingPunct="0">
+              <a:lnSpc>
+                <a:spcPct val="100000"/>
+              </a:lnSpc>
+              <a:spcBef>
+                <a:spcPct val="0"/>
+              </a:spcBef>
+              <a:spcAft>
+                <a:spcPct val="0"/>
+              </a:spcAft>
+              <a:buClrTx/>
+              <a:buSzTx/>
+              <a:buFontTx/>
+              <a:buChar char="•"/>
+              <a:tabLst/>
+            </a:pPr>
+            <a:r>
+              <a:rPr kumimoji="0" lang="en-US" altLang="en-US" sz="1800" i="0" u="none" strike="noStrike" cap="none" normalizeH="0" baseline="0" dirty="0">
+                <a:ln>
+                  <a:noFill/>
+                </a:ln>
+                <a:solidFill>
+                  <a:schemeClr val="tx1"/>
+                </a:solidFill>
+                <a:effectLst/>
+                <a:latin typeface="Arial" panose="020B0604020202020204" pitchFamily="34" charset="0"/>
+              </a:rPr>
+              <a:t>AUC Scores:</a:t>
+            </a:r>
+          </a:p>
+          <a:p>
+            <a:pPr marL="0" marR="0" lvl="0" indent="0" algn="l" defTabSz="914400" rtl="0" eaLnBrk="0" fontAlgn="base" latinLnBrk="0" hangingPunct="0">
+              <a:lnSpc>
+                <a:spcPct val="100000"/>
+              </a:lnSpc>
+              <a:spcBef>
+                <a:spcPct val="0"/>
+              </a:spcBef>
+              <a:spcAft>
+                <a:spcPct val="0"/>
+              </a:spcAft>
+              <a:buClrTx/>
+              <a:buSzTx/>
+              <a:buFontTx/>
+              <a:buChar char="•"/>
+              <a:tabLst/>
+            </a:pPr>
+            <a:r>
+              <a:rPr kumimoji="0" lang="en-US" altLang="en-US" sz="1800" i="0" u="none" strike="noStrike" cap="none" normalizeH="0" baseline="0" dirty="0">
+                <a:ln>
+                  <a:noFill/>
+                </a:ln>
+                <a:solidFill>
+                  <a:schemeClr val="tx1"/>
+                </a:solidFill>
+                <a:effectLst/>
+                <a:latin typeface="Arial" panose="020B0604020202020204" pitchFamily="34" charset="0"/>
+              </a:rPr>
+              <a:t> Random Forest: 0.89 </a:t>
+            </a:r>
+            <a:r>
+              <a:rPr kumimoji="0" lang="en-US" altLang="en-US" sz="1800" i="1" u="none" strike="noStrike" cap="none" normalizeH="0" baseline="0" dirty="0">
+                <a:ln>
+                  <a:noFill/>
+                </a:ln>
+                <a:solidFill>
+                  <a:schemeClr val="tx1"/>
+                </a:solidFill>
+                <a:effectLst/>
+                <a:latin typeface="Arial" panose="020B0604020202020204" pitchFamily="34" charset="0"/>
+              </a:rPr>
+              <a:t>(Best Performer)</a:t>
+            </a:r>
+            <a:endParaRPr kumimoji="0" lang="en-US" altLang="en-US" sz="1800" i="0" u="none" strike="noStrike" cap="none" normalizeH="0" baseline="0" dirty="0">
+              <a:ln>
+                <a:noFill/>
+              </a:ln>
+              <a:solidFill>
+                <a:schemeClr val="tx1"/>
+              </a:solidFill>
+              <a:effectLst/>
+              <a:latin typeface="Arial" panose="020B0604020202020204" pitchFamily="34" charset="0"/>
+            </a:endParaRPr>
+          </a:p>
+          <a:p>
+            <a:pPr marL="0" marR="0" lvl="0" indent="0" algn="l" defTabSz="914400" rtl="0" eaLnBrk="0" fontAlgn="base" latinLnBrk="0" hangingPunct="0">
+              <a:lnSpc>
+                <a:spcPct val="100000"/>
+              </a:lnSpc>
+              <a:spcBef>
+                <a:spcPct val="0"/>
+              </a:spcBef>
+              <a:spcAft>
+                <a:spcPct val="0"/>
+              </a:spcAft>
+              <a:buClrTx/>
+              <a:buSzTx/>
+              <a:buFontTx/>
+              <a:buChar char="•"/>
+              <a:tabLst/>
+            </a:pPr>
+            <a:r>
+              <a:rPr kumimoji="0" lang="en-US" altLang="en-US" sz="1800" i="0" u="none" strike="noStrike" cap="none" normalizeH="0" baseline="0" dirty="0">
+                <a:ln>
+                  <a:noFill/>
+                </a:ln>
+                <a:solidFill>
+                  <a:schemeClr val="tx1"/>
+                </a:solidFill>
+                <a:effectLst/>
+                <a:latin typeface="Arial" panose="020B0604020202020204" pitchFamily="34" charset="0"/>
+              </a:rPr>
+              <a:t> Tuned Decision Tree: 0.82</a:t>
+            </a:r>
+          </a:p>
+          <a:p>
+            <a:pPr marL="0" marR="0" lvl="0" indent="0" algn="l" defTabSz="914400" rtl="0" eaLnBrk="0" fontAlgn="base" latinLnBrk="0" hangingPunct="0">
+              <a:lnSpc>
+                <a:spcPct val="100000"/>
+              </a:lnSpc>
+              <a:spcBef>
+                <a:spcPct val="0"/>
+              </a:spcBef>
+              <a:spcAft>
+                <a:spcPct val="0"/>
+              </a:spcAft>
+              <a:buClrTx/>
+              <a:buSzTx/>
+              <a:buFontTx/>
+              <a:buChar char="•"/>
+              <a:tabLst/>
+            </a:pPr>
+            <a:r>
+              <a:rPr kumimoji="0" lang="en-US" altLang="en-US" sz="1800" i="0" u="none" strike="noStrike" cap="none" normalizeH="0" baseline="0" dirty="0">
+                <a:ln>
+                  <a:noFill/>
+                </a:ln>
+                <a:solidFill>
+                  <a:schemeClr val="tx1"/>
+                </a:solidFill>
+                <a:effectLst/>
+                <a:latin typeface="Arial" panose="020B0604020202020204" pitchFamily="34" charset="0"/>
+              </a:rPr>
+              <a:t> Logistic Regression: 0.81</a:t>
+            </a:r>
+          </a:p>
+          <a:p>
+            <a:pPr marL="0" marR="0" lvl="0" indent="0" algn="l" defTabSz="914400" rtl="0" eaLnBrk="0" fontAlgn="base" latinLnBrk="0" hangingPunct="0">
+              <a:lnSpc>
+                <a:spcPct val="100000"/>
+              </a:lnSpc>
+              <a:spcBef>
+                <a:spcPct val="0"/>
+              </a:spcBef>
+              <a:spcAft>
+                <a:spcPct val="0"/>
+              </a:spcAft>
+              <a:buClrTx/>
+              <a:buSzTx/>
+              <a:buFontTx/>
+              <a:buChar char="•"/>
+              <a:tabLst/>
+            </a:pPr>
+            <a:r>
+              <a:rPr kumimoji="0" lang="en-US" altLang="en-US" sz="1800" i="0" u="none" strike="noStrike" cap="none" normalizeH="0" baseline="0" dirty="0">
+                <a:ln>
+                  <a:noFill/>
+                </a:ln>
+                <a:solidFill>
+                  <a:schemeClr val="tx1"/>
+                </a:solidFill>
+                <a:effectLst/>
+                <a:latin typeface="Arial" panose="020B0604020202020204" pitchFamily="34" charset="0"/>
+              </a:rPr>
+              <a:t> SMOTE Logistic Regression: 0.79</a:t>
+            </a:r>
+          </a:p>
+          <a:p>
+            <a:pPr marL="0" marR="0" lvl="0" indent="0" algn="l" defTabSz="914400" rtl="0" eaLnBrk="0" fontAlgn="base" latinLnBrk="0" hangingPunct="0">
+              <a:lnSpc>
+                <a:spcPct val="100000"/>
+              </a:lnSpc>
+              <a:spcBef>
+                <a:spcPct val="0"/>
+              </a:spcBef>
+              <a:spcAft>
+                <a:spcPct val="0"/>
+              </a:spcAft>
+              <a:buClrTx/>
+              <a:buSzTx/>
+              <a:buFontTx/>
+              <a:buChar char="•"/>
+              <a:tabLst/>
+            </a:pPr>
+            <a:r>
+              <a:rPr kumimoji="0" lang="en-US" altLang="en-US" sz="1800" i="0" u="none" strike="noStrike" cap="none" normalizeH="0" baseline="0" dirty="0">
+                <a:ln>
+                  <a:noFill/>
+                </a:ln>
+                <a:solidFill>
+                  <a:schemeClr val="tx1"/>
+                </a:solidFill>
+                <a:effectLst/>
+                <a:latin typeface="Arial" panose="020B0604020202020204" pitchFamily="34" charset="0"/>
+              </a:rPr>
+              <a:t> Basic Decision Tree: 0.79</a:t>
+            </a:r>
+          </a:p>
+          <a:p>
+            <a:pPr marL="0" marR="0" lvl="0" indent="0" algn="l" defTabSz="914400" rtl="0" eaLnBrk="0" fontAlgn="base" latinLnBrk="0" hangingPunct="0">
+              <a:lnSpc>
+                <a:spcPct val="100000"/>
+              </a:lnSpc>
+              <a:spcBef>
+                <a:spcPct val="0"/>
+              </a:spcBef>
+              <a:spcAft>
+                <a:spcPct val="0"/>
+              </a:spcAft>
+              <a:buClrTx/>
+              <a:buSzTx/>
+              <a:buNone/>
+              <a:tabLst/>
+            </a:pPr>
+            <a:endParaRPr kumimoji="0" lang="en-US" altLang="en-US" sz="1800" i="0" u="none" strike="noStrike" cap="none" normalizeH="0" baseline="0" dirty="0">
+              <a:ln>
+                <a:noFill/>
+              </a:ln>
+              <a:solidFill>
+                <a:schemeClr val="tx1"/>
+              </a:solidFill>
+              <a:effectLst/>
+              <a:latin typeface="Arial" panose="020B0604020202020204" pitchFamily="34" charset="0"/>
+            </a:endParaRPr>
+          </a:p>
+          <a:p>
+            <a:pPr marL="0" marR="0" lvl="0" indent="0" algn="l" defTabSz="914400" rtl="0" eaLnBrk="0" fontAlgn="base" latinLnBrk="0" hangingPunct="0">
+              <a:lnSpc>
+                <a:spcPct val="100000"/>
+              </a:lnSpc>
+              <a:spcBef>
+                <a:spcPct val="0"/>
+              </a:spcBef>
+              <a:spcAft>
+                <a:spcPct val="0"/>
+              </a:spcAft>
+              <a:buClrTx/>
+              <a:buSzTx/>
+              <a:buFontTx/>
+              <a:buChar char="•"/>
+              <a:tabLst/>
+            </a:pPr>
+            <a:r>
+              <a:rPr kumimoji="0" lang="en-US" altLang="en-US" sz="1800" b="1" i="0" u="none" strike="noStrike" cap="none" normalizeH="0" baseline="0" dirty="0">
+                <a:ln>
+                  <a:noFill/>
+                </a:ln>
+                <a:solidFill>
+                  <a:schemeClr val="tx1"/>
+                </a:solidFill>
+                <a:effectLst/>
+                <a:latin typeface="Arial" panose="020B0604020202020204" pitchFamily="34" charset="0"/>
+              </a:rPr>
+              <a:t>Insight:</a:t>
+            </a:r>
+            <a:br>
+              <a:rPr kumimoji="0" lang="en-US" altLang="en-US" sz="1800" i="0" u="none" strike="noStrike" cap="none" normalizeH="0" baseline="0" dirty="0">
+                <a:ln>
+                  <a:noFill/>
+                </a:ln>
+                <a:solidFill>
+                  <a:schemeClr val="tx1"/>
+                </a:solidFill>
+                <a:effectLst/>
+                <a:latin typeface="Arial" panose="020B0604020202020204" pitchFamily="34" charset="0"/>
+              </a:rPr>
+            </a:br>
+            <a:r>
+              <a:rPr kumimoji="0" lang="en-US" altLang="en-US" sz="1800" b="0" i="0" u="none" strike="noStrike" cap="none" normalizeH="0" baseline="0" dirty="0">
+                <a:ln>
+                  <a:noFill/>
+                </a:ln>
+                <a:solidFill>
+                  <a:schemeClr val="tx1"/>
+                </a:solidFill>
+                <a:effectLst/>
+                <a:latin typeface="Arial" panose="020B0604020202020204" pitchFamily="34" charset="0"/>
+              </a:rPr>
+              <a:t>Random Forest shows the best balance of sensitivity and specificity.</a:t>
             </a:r>
           </a:p>
         </p:txBody>
       </p:sp>
     </p:spTree>
+    <p:extLst>
+      <p:ext uri="{BB962C8B-B14F-4D97-AF65-F5344CB8AC3E}">
+        <p14:creationId xmlns:p14="http://schemas.microsoft.com/office/powerpoint/2010/main" val="98171490"/>
+      </p:ext>
+    </p:extLst>
   </p:cSld>
   <p:clrMapOvr>
     <a:masterClrMapping/>

</xml_diff>